<commit_message>
made some changes to the recreating cube simulation part of the presentation
</commit_message>
<xml_diff>
--- a/FinalDeliverables/6.S079FinalPresentation_Arjun_Lucas.pptx
+++ b/FinalDeliverables/6.S079FinalPresentation_Arjun_Lucas.pptx
@@ -3277,13 +3277,8 @@
             <a:pPr lvl="1"/>
             <a:r>
               <a:rPr lang="en-US" dirty="0" smtClean="0"/>
-              <a:t>Eigen dense QR decomposition –TOO MUCH SPACE AND TOO </a:t>
-            </a:r>
-            <a:r>
-              <a:rPr lang="en-US" dirty="0" smtClean="0"/>
-              <a:t>SLOW</a:t>
-            </a:r>
-            <a:endParaRPr lang="en-US" dirty="0" smtClean="0"/>
+              <a:t>Eigen dense QR decomposition –TOO MUCH SPACE AND TOO SLOW</a:t>
+            </a:r>
           </a:p>
           <a:p>
             <a:pPr lvl="1"/>
@@ -3529,7 +3524,19 @@
           <a:p>
             <a:r>
               <a:rPr lang="en-US" dirty="0" smtClean="0"/>
-              <a:t>Measure Young’s Modulus of brick and convert to Lemay parameters</a:t>
+              <a:t>Measure Young’s Modulus of brick and convert to </a:t>
+            </a:r>
+            <a:r>
+              <a:rPr lang="en-US" dirty="0" err="1" smtClean="0"/>
+              <a:t>Neohookean</a:t>
+            </a:r>
+            <a:r>
+              <a:rPr lang="en-US" dirty="0" smtClean="0"/>
+              <a:t> </a:t>
+            </a:r>
+            <a:r>
+              <a:rPr lang="en-US" dirty="0" smtClean="0"/>
+              <a:t>parameters</a:t>
             </a:r>
           </a:p>
           <a:p>
@@ -3769,7 +3776,7 @@
         <p:spPr/>
         <p:txBody>
           <a:bodyPr>
-            <a:normAutofit/>
+            <a:normAutofit fontScale="85000" lnSpcReduction="20000"/>
           </a:bodyPr>
           <a:lstStyle/>
           <a:p>
@@ -3778,12 +3785,33 @@
             </a:pPr>
             <a:r>
               <a:rPr lang="en-US" dirty="0" smtClean="0"/>
-              <a:t>Measured </a:t>
-            </a:r>
+              <a:t>Constructed material model: mu = 7.038*10^4, lambda = 1.056*10^5</a:t>
+            </a:r>
+            <a:endParaRPr lang="en-US" dirty="0" smtClean="0"/>
+          </a:p>
+          <a:p>
+            <a:pPr marL="0" indent="0">
+              <a:buNone/>
+            </a:pPr>
+            <a:endParaRPr lang="en-US" dirty="0" smtClean="0"/>
+          </a:p>
+          <a:p>
+            <a:pPr marL="0" indent="0">
+              <a:buNone/>
+            </a:pPr>
             <a:r>
               <a:rPr lang="en-US" dirty="0" smtClean="0"/>
-              <a:t>data</a:t>
-            </a:r>
+              <a:t>Measured vs </a:t>
+            </a:r>
+            <a:r>
+              <a:rPr lang="en-US" dirty="0"/>
+              <a:t>s</a:t>
+            </a:r>
+            <a:r>
+              <a:rPr lang="en-US" dirty="0" smtClean="0"/>
+              <a:t>imulated data</a:t>
+            </a:r>
+            <a:endParaRPr lang="en-US" dirty="0" smtClean="0"/>
           </a:p>
           <a:p>
             <a:pPr marL="0" indent="0">
@@ -3830,9 +3858,16 @@
             </a:pPr>
             <a:r>
               <a:rPr lang="en-US" dirty="0" smtClean="0"/>
-              <a:t>Error decreases with more force</a:t>
-            </a:r>
-            <a:endParaRPr lang="en-US" dirty="0" smtClean="0"/>
+              <a:t>Error </a:t>
+            </a:r>
+            <a:r>
+              <a:rPr lang="en-US" dirty="0" smtClean="0"/>
+              <a:t>decreases with more </a:t>
+            </a:r>
+            <a:r>
+              <a:rPr lang="en-US" dirty="0" smtClean="0"/>
+              <a:t>force</a:t>
+            </a:r>
           </a:p>
           <a:p>
             <a:pPr marL="0" indent="0">
@@ -3882,13 +3917,13 @@
           <p:nvPr>
             <p:extLst>
               <p:ext uri="{D42A27DB-BD31-4B8C-83A1-F6EECF244321}">
-                <p14:modId xmlns:p14="http://schemas.microsoft.com/office/powerpoint/2010/main" val="3016782115"/>
+                <p14:modId xmlns:p14="http://schemas.microsoft.com/office/powerpoint/2010/main" val="2938198055"/>
               </p:ext>
             </p:extLst>
           </p:nvPr>
         </p:nvGraphicFramePr>
         <p:xfrm>
-          <a:off x="342900" y="2286000"/>
+          <a:off x="342900" y="3352800"/>
           <a:ext cx="8458200" cy="2473959"/>
         </p:xfrm>
         <a:graphic>
@@ -3937,11 +3972,7 @@
                       </a:r>
                       <a:r>
                         <a:rPr lang="en-US" baseline="0" dirty="0" smtClean="0"/>
-                        <a:t> </a:t>
-                      </a:r>
-                      <a:r>
-                        <a:rPr lang="en-US" baseline="0" dirty="0" smtClean="0"/>
-                        <a:t>of Cube (inches)</a:t>
+                        <a:t> of Cube (inches)</a:t>
                       </a:r>
                       <a:endParaRPr lang="en-US" dirty="0"/>
                     </a:p>
@@ -4224,6 +4255,37 @@
           </a:graphicData>
         </a:graphic>
       </p:graphicFrame>
+      <p:sp>
+        <p:nvSpPr>
+          <p:cNvPr id="6" name="TextBox 5"/>
+          <p:cNvSpPr txBox="1"/>
+          <p:nvPr/>
+        </p:nvSpPr>
+        <p:spPr>
+          <a:xfrm>
+            <a:off x="381000" y="6172199"/>
+            <a:ext cx="8153400" cy="461665"/>
+          </a:xfrm>
+          <a:prstGeom prst="rect">
+            <a:avLst/>
+          </a:prstGeom>
+          <a:noFill/>
+        </p:spPr>
+        <p:txBody>
+          <a:bodyPr wrap="square" rtlCol="0">
+            <a:spAutoFit/>
+          </a:bodyPr>
+          <a:lstStyle/>
+          <a:p>
+            <a:pPr algn="ctr"/>
+            <a:r>
+              <a:rPr lang="en-US" sz="2400" dirty="0" smtClean="0"/>
+              <a:t>Error decreases with more force</a:t>
+            </a:r>
+            <a:endParaRPr lang="en-US" sz="2400" dirty="0"/>
+          </a:p>
+        </p:txBody>
+      </p:sp>
     </p:spTree>
     <p:extLst>
       <p:ext uri="{BB962C8B-B14F-4D97-AF65-F5344CB8AC3E}">
@@ -4590,15 +4652,7 @@
           <a:p>
             <a:r>
               <a:rPr lang="en-US" dirty="0" smtClean="0"/>
-              <a:t>As mentioned, thanks to Desai for some resources on </a:t>
-            </a:r>
-            <a:r>
-              <a:rPr lang="en-US" dirty="0" smtClean="0"/>
-              <a:t>Hexahedral </a:t>
-            </a:r>
-            <a:r>
-              <a:rPr lang="en-US" dirty="0" smtClean="0"/>
-              <a:t>elements</a:t>
+              <a:t>As mentioned, thanks to Desai for some resources on Hexahedral elements</a:t>
             </a:r>
           </a:p>
           <a:p>

</xml_diff>